<commit_message>
got NN to predict better
</commit_message>
<xml_diff>
--- a/Final Project.pptx
+++ b/Final Project.pptx
@@ -5,10 +5,10 @@
     <p:sldMasterId id="2147483648" r:id="rId1"/>
   </p:sldMasterIdLst>
   <p:notesMasterIdLst>
-    <p:notesMasterId r:id="rId9"/>
+    <p:notesMasterId r:id="rId10"/>
   </p:notesMasterIdLst>
   <p:handoutMasterIdLst>
-    <p:handoutMasterId r:id="rId10"/>
+    <p:handoutMasterId r:id="rId11"/>
   </p:handoutMasterIdLst>
   <p:sldIdLst>
     <p:sldId id="256" r:id="rId2"/>
@@ -16,8 +16,9 @@
     <p:sldId id="260" r:id="rId4"/>
     <p:sldId id="262" r:id="rId5"/>
     <p:sldId id="263" r:id="rId6"/>
-    <p:sldId id="264" r:id="rId7"/>
-    <p:sldId id="261" r:id="rId8"/>
+    <p:sldId id="265" r:id="rId7"/>
+    <p:sldId id="264" r:id="rId8"/>
+    <p:sldId id="261" r:id="rId9"/>
   </p:sldIdLst>
   <p:sldSz cx="9144000" cy="6858000" type="screen4x3"/>
   <p:notesSz cx="6858000" cy="9144000"/>
@@ -213,6 +214,11 @@
         </a:xfrm>
       </p:grpSpPr>
     </p:spTree>
+    <p:extLst>
+      <p:ext uri="{BB962C8B-B14F-4D97-AF65-F5344CB8AC3E}">
+        <p14:creationId xmlns:p14="http://schemas.microsoft.com/office/powerpoint/2010/main" val="1"/>
+      </p:ext>
+    </p:extLst>
   </p:cSld>
   <p:clrMap bg1="lt1" tx1="dk1" bg2="lt2" tx2="dk2" accent1="accent1" accent2="accent2" accent3="accent3" accent4="accent4" accent5="accent5" accent6="accent6" hlink="hlink" folHlink="folHlink"/>
 </p:handoutMaster>
@@ -401,7 +407,7 @@
             </a:extLst>
           </p:cNvPr>
           <p:cNvSpPr>
-            <a:spLocks noRot="1" noChangeArrowheads="1" noTextEdit="1"/>
+            <a:spLocks noGrp="1" noRot="1" noChangeAspect="1" noChangeArrowheads="1" noTextEdit="1"/>
           </p:cNvSpPr>
           <p:nvPr>
             <p:ph type="sldImg" idx="2"/>
@@ -3905,6 +3911,116 @@
     </p:spTree>
     <p:extLst>
       <p:ext uri="{BB962C8B-B14F-4D97-AF65-F5344CB8AC3E}">
+        <p14:creationId xmlns:p14="http://schemas.microsoft.com/office/powerpoint/2010/main" val="4066231231"/>
+      </p:ext>
+    </p:extLst>
+  </p:cSld>
+  <p:clrMapOvr>
+    <a:masterClrMapping/>
+  </p:clrMapOvr>
+</p:sld>
+</file>
+
+<file path=ppt/slides/slide7.xml><?xml version="1.0" encoding="utf-8"?>
+<p:sld xmlns:a="http://schemas.openxmlformats.org/drawingml/2006/main" xmlns:r="http://schemas.openxmlformats.org/officeDocument/2006/relationships" xmlns:p="http://schemas.openxmlformats.org/presentationml/2006/main">
+  <p:cSld>
+    <p:bg>
+      <p:bgPr>
+        <a:blipFill dpi="0" rotWithShape="0">
+          <a:blip r:embed="rId2"/>
+          <a:srcRect/>
+          <a:stretch>
+            <a:fillRect/>
+          </a:stretch>
+        </a:blipFill>
+        <a:effectLst/>
+      </p:bgPr>
+    </p:bg>
+    <p:spTree>
+      <p:nvGrpSpPr>
+        <p:cNvPr id="1" name=""/>
+        <p:cNvGrpSpPr/>
+        <p:nvPr/>
+      </p:nvGrpSpPr>
+      <p:grpSpPr>
+        <a:xfrm>
+          <a:off x="0" y="0"/>
+          <a:ext cx="0" cy="0"/>
+          <a:chOff x="0" y="0"/>
+          <a:chExt cx="0" cy="0"/>
+        </a:xfrm>
+      </p:grpSpPr>
+      <p:sp>
+        <p:nvSpPr>
+          <p:cNvPr id="114690" name="Rectangle 2">
+            <a:extLst>
+              <a:ext uri="{FF2B5EF4-FFF2-40B4-BE49-F238E27FC236}">
+                <a16:creationId xmlns:a16="http://schemas.microsoft.com/office/drawing/2014/main" id="{27BB101D-27FA-45F4-A80A-653BCCC52DE7}"/>
+              </a:ext>
+            </a:extLst>
+          </p:cNvPr>
+          <p:cNvSpPr>
+            <a:spLocks noGrp="1" noChangeArrowheads="1"/>
+          </p:cNvSpPr>
+          <p:nvPr>
+            <p:ph type="title"/>
+          </p:nvPr>
+        </p:nvSpPr>
+        <p:spPr>
+          <a:xfrm>
+            <a:off x="1908175" y="188913"/>
+            <a:ext cx="7127875" cy="723900"/>
+          </a:xfrm>
+        </p:spPr>
+        <p:txBody>
+          <a:bodyPr/>
+          <a:lstStyle/>
+          <a:p>
+            <a:pPr algn="l"/>
+            <a:r>
+              <a:rPr lang="en-US" altLang="en-US" sz="2800" dirty="0">
+                <a:solidFill>
+                  <a:schemeClr val="tx1"/>
+                </a:solidFill>
+              </a:rPr>
+              <a:t>Lessons Learned</a:t>
+            </a:r>
+          </a:p>
+        </p:txBody>
+      </p:sp>
+      <p:sp>
+        <p:nvSpPr>
+          <p:cNvPr id="114691" name="Rectangle 3">
+            <a:extLst>
+              <a:ext uri="{FF2B5EF4-FFF2-40B4-BE49-F238E27FC236}">
+                <a16:creationId xmlns:a16="http://schemas.microsoft.com/office/drawing/2014/main" id="{B70EA7FD-27C0-45C1-8C35-02D3973F15DF}"/>
+              </a:ext>
+            </a:extLst>
+          </p:cNvPr>
+          <p:cNvSpPr>
+            <a:spLocks noGrp="1" noChangeArrowheads="1"/>
+          </p:cNvSpPr>
+          <p:nvPr>
+            <p:ph type="body" idx="1"/>
+          </p:nvPr>
+        </p:nvSpPr>
+        <p:spPr>
+          <a:xfrm>
+            <a:off x="1919288" y="1052513"/>
+            <a:ext cx="7116762" cy="5616575"/>
+          </a:xfrm>
+        </p:spPr>
+        <p:txBody>
+          <a:bodyPr/>
+          <a:lstStyle/>
+          <a:p>
+            <a:endParaRPr lang="en-US" altLang="en-US" dirty="0"/>
+          </a:p>
+        </p:txBody>
+      </p:sp>
+    </p:spTree>
+    <p:extLst>
+      <p:ext uri="{BB962C8B-B14F-4D97-AF65-F5344CB8AC3E}">
         <p14:creationId xmlns:p14="http://schemas.microsoft.com/office/powerpoint/2010/main" val="1084838679"/>
       </p:ext>
     </p:extLst>
@@ -3915,7 +4031,7 @@
 </p:sld>
 </file>
 
-<file path=ppt/slides/slide7.xml><?xml version="1.0" encoding="utf-8"?>
+<file path=ppt/slides/slide8.xml><?xml version="1.0" encoding="utf-8"?>
 <p:sld xmlns:a="http://schemas.openxmlformats.org/drawingml/2006/main" xmlns:r="http://schemas.openxmlformats.org/officeDocument/2006/relationships" xmlns:p="http://schemas.openxmlformats.org/presentationml/2006/main">
   <p:cSld>
     <p:bg>

</xml_diff>